<commit_message>
S4D400 ABAP Programming on S/4HANA
</commit_message>
<xml_diff>
--- a/day 2/S4D400 - Day 2.pptx
+++ b/day 2/S4D400 - Day 2.pptx
@@ -235,7 +235,7 @@
           <a:p>
             <a:fld id="{4AF2A06D-4991-4208-8C88-4E8BAD69A8B8}" type="datetimeFigureOut">
               <a:rPr lang="en-US" smtClean="0"/>
-              <a:t>11/14/2020</a:t>
+              <a:t>11/15/2020</a:t>
             </a:fld>
             <a:endParaRPr lang="en-US"/>
           </a:p>
@@ -1268,7 +1268,7 @@
           <a:p>
             <a:fld id="{E26E0DA5-0C76-4851-AA82-0B75261F9EB4}" type="datetimeFigureOut">
               <a:rPr lang="en-US" smtClean="0"/>
-              <a:t>11/14/2020</a:t>
+              <a:t>11/15/2020</a:t>
             </a:fld>
             <a:endParaRPr lang="en-US"/>
           </a:p>
@@ -1436,7 +1436,7 @@
           <a:p>
             <a:fld id="{E26E0DA5-0C76-4851-AA82-0B75261F9EB4}" type="datetimeFigureOut">
               <a:rPr lang="en-US" smtClean="0"/>
-              <a:t>11/14/2020</a:t>
+              <a:t>11/15/2020</a:t>
             </a:fld>
             <a:endParaRPr lang="en-US"/>
           </a:p>
@@ -1614,7 +1614,7 @@
           <a:p>
             <a:fld id="{E26E0DA5-0C76-4851-AA82-0B75261F9EB4}" type="datetimeFigureOut">
               <a:rPr lang="en-US" smtClean="0"/>
-              <a:t>11/14/2020</a:t>
+              <a:t>11/15/2020</a:t>
             </a:fld>
             <a:endParaRPr lang="en-US"/>
           </a:p>
@@ -1782,7 +1782,7 @@
           <a:p>
             <a:fld id="{E26E0DA5-0C76-4851-AA82-0B75261F9EB4}" type="datetimeFigureOut">
               <a:rPr lang="en-US" smtClean="0"/>
-              <a:t>11/14/2020</a:t>
+              <a:t>11/15/2020</a:t>
             </a:fld>
             <a:endParaRPr lang="en-US"/>
           </a:p>
@@ -2027,7 +2027,7 @@
           <a:p>
             <a:fld id="{E26E0DA5-0C76-4851-AA82-0B75261F9EB4}" type="datetimeFigureOut">
               <a:rPr lang="en-US" smtClean="0"/>
-              <a:t>11/14/2020</a:t>
+              <a:t>11/15/2020</a:t>
             </a:fld>
             <a:endParaRPr lang="en-US"/>
           </a:p>
@@ -2256,7 +2256,7 @@
           <a:p>
             <a:fld id="{E26E0DA5-0C76-4851-AA82-0B75261F9EB4}" type="datetimeFigureOut">
               <a:rPr lang="en-US" smtClean="0"/>
-              <a:t>11/14/2020</a:t>
+              <a:t>11/15/2020</a:t>
             </a:fld>
             <a:endParaRPr lang="en-US"/>
           </a:p>
@@ -2620,7 +2620,7 @@
           <a:p>
             <a:fld id="{E26E0DA5-0C76-4851-AA82-0B75261F9EB4}" type="datetimeFigureOut">
               <a:rPr lang="en-US" smtClean="0"/>
-              <a:t>11/14/2020</a:t>
+              <a:t>11/15/2020</a:t>
             </a:fld>
             <a:endParaRPr lang="en-US"/>
           </a:p>
@@ -2737,7 +2737,7 @@
           <a:p>
             <a:fld id="{E26E0DA5-0C76-4851-AA82-0B75261F9EB4}" type="datetimeFigureOut">
               <a:rPr lang="en-US" smtClean="0"/>
-              <a:t>11/14/2020</a:t>
+              <a:t>11/15/2020</a:t>
             </a:fld>
             <a:endParaRPr lang="en-US"/>
           </a:p>
@@ -2832,7 +2832,7 @@
           <a:p>
             <a:fld id="{E26E0DA5-0C76-4851-AA82-0B75261F9EB4}" type="datetimeFigureOut">
               <a:rPr lang="en-US" smtClean="0"/>
-              <a:t>11/14/2020</a:t>
+              <a:t>11/15/2020</a:t>
             </a:fld>
             <a:endParaRPr lang="en-US"/>
           </a:p>
@@ -3107,7 +3107,7 @@
           <a:p>
             <a:fld id="{E26E0DA5-0C76-4851-AA82-0B75261F9EB4}" type="datetimeFigureOut">
               <a:rPr lang="en-US" smtClean="0"/>
-              <a:t>11/14/2020</a:t>
+              <a:t>11/15/2020</a:t>
             </a:fld>
             <a:endParaRPr lang="en-US"/>
           </a:p>
@@ -3359,7 +3359,7 @@
           <a:p>
             <a:fld id="{E26E0DA5-0C76-4851-AA82-0B75261F9EB4}" type="datetimeFigureOut">
               <a:rPr lang="en-US" smtClean="0"/>
-              <a:t>11/14/2020</a:t>
+              <a:t>11/15/2020</a:t>
             </a:fld>
             <a:endParaRPr lang="en-US"/>
           </a:p>
@@ -3570,7 +3570,7 @@
           <a:p>
             <a:fld id="{E26E0DA5-0C76-4851-AA82-0B75261F9EB4}" type="datetimeFigureOut">
               <a:rPr lang="en-US" smtClean="0"/>
-              <a:t>11/14/2020</a:t>
+              <a:t>11/15/2020</a:t>
             </a:fld>
             <a:endParaRPr lang="en-US"/>
           </a:p>
@@ -6280,15 +6280,22 @@
           <a:p>
             <a:r>
               <a:rPr lang="en-US" sz="2400" dirty="0"/>
-              <a:t>Program Name: ZNC_XX_DATAOBJ</a:t>
-            </a:r>
+              <a:t>Program Name: </a:t>
+            </a:r>
+            <a:r>
+              <a:rPr lang="en-US" sz="2400" dirty="0">
+                <a:hlinkClick r:id="rId2"/>
+              </a:rPr>
+              <a:t>ZNC_XX_DATAOBJ</a:t>
+            </a:r>
+            <a:endParaRPr lang="en-US" sz="2400" dirty="0"/>
           </a:p>
         </p:txBody>
       </p:sp>
       <p:pic>
         <p:nvPicPr>
           <p:cNvPr id="2050" name="Picture 2" descr="NetCom Logo">
-            <a:hlinkClick r:id="rId2"/>
+            <a:hlinkClick r:id="rId3"/>
             <a:extLst>
               <a:ext uri="{FF2B5EF4-FFF2-40B4-BE49-F238E27FC236}">
                 <a16:creationId xmlns:a16="http://schemas.microsoft.com/office/drawing/2014/main" id="{2B8D59D5-A57D-4846-863C-31591ACCF193}"/>
@@ -6301,7 +6308,7 @@
           <p:nvPr/>
         </p:nvPicPr>
         <p:blipFill>
-          <a:blip r:embed="rId3" cstate="print">
+          <a:blip r:embed="rId4" cstate="print">
             <a:extLst>
               <a:ext uri="{28A0092B-C50C-407E-A947-70E740481C1C}">
                 <a14:useLocalDpi xmlns:a14="http://schemas.microsoft.com/office/drawing/2010/main" val="0"/>
@@ -8284,15 +8291,22 @@
           <a:p>
             <a:r>
               <a:rPr lang="en-US" sz="2400" dirty="0"/>
-              <a:t>Program Name: ZNC_XX_CTYPE</a:t>
-            </a:r>
+              <a:t>Program Name: </a:t>
+            </a:r>
+            <a:r>
+              <a:rPr lang="en-US" sz="2400" dirty="0">
+                <a:hlinkClick r:id="rId2"/>
+              </a:rPr>
+              <a:t>ZNC_XX_CTYPE</a:t>
+            </a:r>
+            <a:endParaRPr lang="en-US" sz="2400" dirty="0"/>
           </a:p>
         </p:txBody>
       </p:sp>
       <p:pic>
         <p:nvPicPr>
           <p:cNvPr id="2050" name="Picture 2" descr="NetCom Logo">
-            <a:hlinkClick r:id="rId2"/>
+            <a:hlinkClick r:id="rId3"/>
             <a:extLst>
               <a:ext uri="{FF2B5EF4-FFF2-40B4-BE49-F238E27FC236}">
                 <a16:creationId xmlns:a16="http://schemas.microsoft.com/office/drawing/2014/main" id="{2B8D59D5-A57D-4846-863C-31591ACCF193}"/>
@@ -8305,7 +8319,7 @@
           <p:nvPr/>
         </p:nvPicPr>
         <p:blipFill>
-          <a:blip r:embed="rId3" cstate="print">
+          <a:blip r:embed="rId4" cstate="print">
             <a:extLst>
               <a:ext uri="{28A0092B-C50C-407E-A947-70E740481C1C}">
                 <a14:useLocalDpi xmlns:a14="http://schemas.microsoft.com/office/drawing/2010/main" val="0"/>
@@ -9732,15 +9746,22 @@
           <a:p>
             <a:r>
               <a:rPr lang="en-US" sz="2400" dirty="0"/>
-              <a:t>Program: ZNC_XX_FIELDSTRING</a:t>
-            </a:r>
+              <a:t>Program: </a:t>
+            </a:r>
+            <a:r>
+              <a:rPr lang="en-US" sz="2400" dirty="0">
+                <a:hlinkClick r:id="rId2"/>
+              </a:rPr>
+              <a:t>ZNC_XX_FIELDSTRING</a:t>
+            </a:r>
+            <a:endParaRPr lang="en-US" sz="2400" dirty="0"/>
           </a:p>
         </p:txBody>
       </p:sp>
       <p:pic>
         <p:nvPicPr>
           <p:cNvPr id="2050" name="Picture 2" descr="NetCom Logo">
-            <a:hlinkClick r:id="rId2"/>
+            <a:hlinkClick r:id="rId3"/>
             <a:extLst>
               <a:ext uri="{FF2B5EF4-FFF2-40B4-BE49-F238E27FC236}">
                 <a16:creationId xmlns:a16="http://schemas.microsoft.com/office/drawing/2014/main" id="{2B8D59D5-A57D-4846-863C-31591ACCF193}"/>
@@ -9753,7 +9774,7 @@
           <p:nvPr/>
         </p:nvPicPr>
         <p:blipFill>
-          <a:blip r:embed="rId3" cstate="print">
+          <a:blip r:embed="rId4" cstate="print">
             <a:extLst>
               <a:ext uri="{28A0092B-C50C-407E-A947-70E740481C1C}">
                 <a14:useLocalDpi xmlns:a14="http://schemas.microsoft.com/office/drawing/2010/main" val="0"/>
@@ -10330,14 +10351,31 @@
           <a:p>
             <a:r>
               <a:rPr lang="en-US" sz="2400" dirty="0"/>
-              <a:t>Program: ZNC_XX_TYPES </a:t>
-            </a:r>
-          </a:p>
-          <a:p>
+              <a:t>Program: </a:t>
+            </a:r>
+            <a:r>
+              <a:rPr lang="en-US" sz="2400" dirty="0">
+                <a:hlinkClick r:id="rId2"/>
+              </a:rPr>
+              <a:t>ZNC_XX_TYPES</a:t>
+            </a:r>
             <a:r>
               <a:rPr lang="en-US" sz="2400" dirty="0"/>
-              <a:t>Type-pools: ZTX1</a:t>
-            </a:r>
+              <a:t> </a:t>
+            </a:r>
+          </a:p>
+          <a:p>
+            <a:r>
+              <a:rPr lang="en-US" sz="2400" dirty="0"/>
+              <a:t>Type-pools: </a:t>
+            </a:r>
+            <a:r>
+              <a:rPr lang="en-US" sz="2400" dirty="0">
+                <a:hlinkClick r:id="rId3"/>
+              </a:rPr>
+              <a:t>ZTX1</a:t>
+            </a:r>
+            <a:endParaRPr lang="en-US" sz="2400" dirty="0"/>
           </a:p>
           <a:p>
             <a:endParaRPr lang="en-US" sz="2400" dirty="0"/>
@@ -10347,7 +10385,7 @@
       <p:pic>
         <p:nvPicPr>
           <p:cNvPr id="2050" name="Picture 2" descr="NetCom Logo">
-            <a:hlinkClick r:id="rId2"/>
+            <a:hlinkClick r:id="rId4"/>
             <a:extLst>
               <a:ext uri="{FF2B5EF4-FFF2-40B4-BE49-F238E27FC236}">
                 <a16:creationId xmlns:a16="http://schemas.microsoft.com/office/drawing/2014/main" id="{2B8D59D5-A57D-4846-863C-31591ACCF193}"/>
@@ -10360,7 +10398,7 @@
           <p:nvPr/>
         </p:nvPicPr>
         <p:blipFill>
-          <a:blip r:embed="rId3" cstate="print">
+          <a:blip r:embed="rId5" cstate="print">
             <a:extLst>
               <a:ext uri="{28A0092B-C50C-407E-A947-70E740481C1C}">
                 <a14:useLocalDpi xmlns:a14="http://schemas.microsoft.com/office/drawing/2010/main" val="0"/>
@@ -11171,15 +11209,22 @@
           <a:p>
             <a:r>
               <a:rPr lang="en-US" sz="2400" dirty="0"/>
-              <a:t>Program Name: ZNC_XX_IF</a:t>
-            </a:r>
+              <a:t>Program Name: </a:t>
+            </a:r>
+            <a:r>
+              <a:rPr lang="en-US" sz="2400" dirty="0">
+                <a:hlinkClick r:id="rId2"/>
+              </a:rPr>
+              <a:t>ZNC_XX_IF</a:t>
+            </a:r>
+            <a:endParaRPr lang="en-US" sz="2400" dirty="0"/>
           </a:p>
         </p:txBody>
       </p:sp>
       <p:pic>
         <p:nvPicPr>
           <p:cNvPr id="2050" name="Picture 2" descr="NetCom Logo">
-            <a:hlinkClick r:id="rId2"/>
+            <a:hlinkClick r:id="rId3"/>
             <a:extLst>
               <a:ext uri="{FF2B5EF4-FFF2-40B4-BE49-F238E27FC236}">
                 <a16:creationId xmlns:a16="http://schemas.microsoft.com/office/drawing/2014/main" id="{2B8D59D5-A57D-4846-863C-31591ACCF193}"/>
@@ -11192,7 +11237,7 @@
           <p:nvPr/>
         </p:nvPicPr>
         <p:blipFill>
-          <a:blip r:embed="rId3" cstate="print">
+          <a:blip r:embed="rId4" cstate="print">
             <a:extLst>
               <a:ext uri="{28A0092B-C50C-407E-A947-70E740481C1C}">
                 <a14:useLocalDpi xmlns:a14="http://schemas.microsoft.com/office/drawing/2010/main" val="0"/>
@@ -12516,15 +12561,22 @@
           <a:p>
             <a:r>
               <a:rPr lang="en-US" sz="2400" dirty="0"/>
-              <a:t>Program Name: ZNC_XX_DO</a:t>
-            </a:r>
+              <a:t>Program Name: </a:t>
+            </a:r>
+            <a:r>
+              <a:rPr lang="en-US" sz="2400" dirty="0">
+                <a:hlinkClick r:id="rId2"/>
+              </a:rPr>
+              <a:t>ZNC_XX_DO</a:t>
+            </a:r>
+            <a:endParaRPr lang="en-US" sz="2400" dirty="0"/>
           </a:p>
         </p:txBody>
       </p:sp>
       <p:pic>
         <p:nvPicPr>
           <p:cNvPr id="2050" name="Picture 2" descr="NetCom Logo">
-            <a:hlinkClick r:id="rId2"/>
+            <a:hlinkClick r:id="rId3"/>
             <a:extLst>
               <a:ext uri="{FF2B5EF4-FFF2-40B4-BE49-F238E27FC236}">
                 <a16:creationId xmlns:a16="http://schemas.microsoft.com/office/drawing/2014/main" id="{2B8D59D5-A57D-4846-863C-31591ACCF193}"/>
@@ -12537,7 +12589,7 @@
           <p:nvPr/>
         </p:nvPicPr>
         <p:blipFill>
-          <a:blip r:embed="rId3" cstate="print">
+          <a:blip r:embed="rId4" cstate="print">
             <a:extLst>
               <a:ext uri="{28A0092B-C50C-407E-A947-70E740481C1C}">
                 <a14:useLocalDpi xmlns:a14="http://schemas.microsoft.com/office/drawing/2010/main" val="0"/>
@@ -13442,15 +13494,22 @@
           <a:p>
             <a:r>
               <a:rPr lang="en-US" sz="2400" dirty="0"/>
-              <a:t>Program Name: ZNC_XX_WHILEC</a:t>
-            </a:r>
+              <a:t>Program Name: </a:t>
+            </a:r>
+            <a:r>
+              <a:rPr lang="en-US" sz="2400" dirty="0">
+                <a:hlinkClick r:id="rId2"/>
+              </a:rPr>
+              <a:t>ZNC_XX_WHILEC</a:t>
+            </a:r>
+            <a:endParaRPr lang="en-US" sz="2400" dirty="0"/>
           </a:p>
         </p:txBody>
       </p:sp>
       <p:pic>
         <p:nvPicPr>
           <p:cNvPr id="2050" name="Picture 2" descr="NetCom Logo">
-            <a:hlinkClick r:id="rId2"/>
+            <a:hlinkClick r:id="rId3"/>
             <a:extLst>
               <a:ext uri="{FF2B5EF4-FFF2-40B4-BE49-F238E27FC236}">
                 <a16:creationId xmlns:a16="http://schemas.microsoft.com/office/drawing/2014/main" id="{2B8D59D5-A57D-4846-863C-31591ACCF193}"/>
@@ -13463,7 +13522,7 @@
           <p:nvPr/>
         </p:nvPicPr>
         <p:blipFill>
-          <a:blip r:embed="rId3" cstate="print">
+          <a:blip r:embed="rId4" cstate="print">
             <a:extLst>
               <a:ext uri="{28A0092B-C50C-407E-A947-70E740481C1C}">
                 <a14:useLocalDpi xmlns:a14="http://schemas.microsoft.com/office/drawing/2010/main" val="0"/>
@@ -15242,8 +15301,15 @@
           <a:p>
             <a:r>
               <a:rPr lang="en-US" sz="2400" dirty="0"/>
-              <a:t>Write below ABAP programs – ZNC_XX_FIRST</a:t>
-            </a:r>
+              <a:t>Write below ABAP programs – </a:t>
+            </a:r>
+            <a:r>
+              <a:rPr lang="en-US" sz="2400" dirty="0">
+                <a:hlinkClick r:id="rId2"/>
+              </a:rPr>
+              <a:t>ZNC_XX_FIRST</a:t>
+            </a:r>
+            <a:endParaRPr lang="en-US" sz="2400" dirty="0"/>
           </a:p>
           <a:p>
             <a:endParaRPr lang="en-US" sz="2400" dirty="0"/>
@@ -15289,7 +15355,7 @@
       <p:pic>
         <p:nvPicPr>
           <p:cNvPr id="2050" name="Picture 2" descr="NetCom Logo">
-            <a:hlinkClick r:id="rId2"/>
+            <a:hlinkClick r:id="rId3"/>
             <a:extLst>
               <a:ext uri="{FF2B5EF4-FFF2-40B4-BE49-F238E27FC236}">
                 <a16:creationId xmlns:a16="http://schemas.microsoft.com/office/drawing/2014/main" id="{2B8D59D5-A57D-4846-863C-31591ACCF193}"/>
@@ -15302,7 +15368,7 @@
           <p:nvPr/>
         </p:nvPicPr>
         <p:blipFill>
-          <a:blip r:embed="rId3" cstate="print">
+          <a:blip r:embed="rId4" cstate="print">
             <a:extLst>
               <a:ext uri="{28A0092B-C50C-407E-A947-70E740481C1C}">
                 <a14:useLocalDpi xmlns:a14="http://schemas.microsoft.com/office/drawing/2010/main" val="0"/>
@@ -15349,7 +15415,7 @@
           <p:nvPr/>
         </p:nvPicPr>
         <p:blipFill>
-          <a:blip r:embed="rId4"/>
+          <a:blip r:embed="rId5"/>
           <a:stretch>
             <a:fillRect/>
           </a:stretch>
@@ -15379,7 +15445,7 @@
           <p:nvPr/>
         </p:nvPicPr>
         <p:blipFill>
-          <a:blip r:embed="rId5"/>
+          <a:blip r:embed="rId6"/>
           <a:stretch>
             <a:fillRect/>
           </a:stretch>

</xml_diff>